<commit_message>
updated readme, added zero-copy and front-end
</commit_message>
<xml_diff>
--- a/slides/instruction/principleWindows_2.pptx
+++ b/slides/instruction/principleWindows_2.pptx
@@ -3493,7 +3493,7 @@
           <a:p>
             <a:fld id="{62B690D2-9F6C-4A40-B045-5871089CDE7B}" type="datetimeFigureOut">
               <a:rPr lang="zh-CN" altLang="en-US" smtClean="0"/>
-              <a:t>2020/9/15</a:t>
+              <a:t>2020/9/16</a:t>
             </a:fld>
             <a:endParaRPr lang="zh-CN" altLang="en-US"/>
           </a:p>
@@ -4109,16 +4109,91 @@
           <a:p>
             <a:r>
               <a:rPr lang="en-US" altLang="zh-CN" dirty="0"/>
-              <a:t>pip</a:t>
-            </a:r>
-            <a:br>
+              <a:t>VC++</a:t>
+            </a:r>
+            <a:r>
+              <a:rPr lang="zh-CN" altLang="en-US" dirty="0"/>
+              <a:t>中 </a:t>
+            </a:r>
+            <a:r>
               <a:rPr lang="en-US" altLang="zh-CN" dirty="0"/>
-            </a:br>
+              <a:t>system</a:t>
+            </a:r>
+            <a:r>
+              <a:rPr lang="zh-CN" altLang="en-US" dirty="0"/>
+              <a:t>（）</a:t>
+            </a:r>
             <a:r>
               <a:rPr lang="en-US" altLang="zh-CN" dirty="0"/>
-              <a:t>apt-get</a:t>
-            </a:r>
-            <a:endParaRPr lang="zh-CN" altLang="en-US" dirty="0"/>
+              <a:t>, </a:t>
+            </a:r>
+            <a:r>
+              <a:rPr lang="en-US" altLang="zh-CN" dirty="0" err="1"/>
+              <a:t>WinExec</a:t>
+            </a:r>
+            <a:r>
+              <a:rPr lang="zh-CN" altLang="en-US" dirty="0"/>
+              <a:t>（）</a:t>
+            </a:r>
+            <a:r>
+              <a:rPr lang="en-US" altLang="zh-CN" dirty="0"/>
+              <a:t>, </a:t>
+            </a:r>
+            <a:r>
+              <a:rPr lang="en-US" altLang="zh-CN" dirty="0" err="1"/>
+              <a:t>ShellExecute</a:t>
+            </a:r>
+            <a:r>
+              <a:rPr lang="zh-CN" altLang="en-US" dirty="0"/>
+              <a:t>（）</a:t>
+            </a:r>
+            <a:r>
+              <a:rPr lang="en-US" altLang="zh-CN" dirty="0"/>
+              <a:t>,</a:t>
+            </a:r>
+            <a:r>
+              <a:rPr lang="en-US" altLang="zh-CN" dirty="0" err="1"/>
+              <a:t>CreateProcess</a:t>
+            </a:r>
+            <a:r>
+              <a:rPr lang="zh-CN" altLang="en-US" dirty="0"/>
+              <a:t>（）</a:t>
+            </a:r>
+            <a:endParaRPr lang="en-US" altLang="zh-CN" dirty="0"/>
+          </a:p>
+          <a:p>
+            <a:r>
+              <a:rPr lang="en-US" altLang="zh-CN" dirty="0"/>
+              <a:t>Win32 </a:t>
+            </a:r>
+            <a:r>
+              <a:rPr lang="en-US" altLang="zh-CN" dirty="0" err="1"/>
+              <a:t>CreateProcess</a:t>
+            </a:r>
+            <a:r>
+              <a:rPr lang="en-US" altLang="zh-CN" dirty="0"/>
+              <a:t> (), </a:t>
+            </a:r>
+            <a:r>
+              <a:rPr lang="en-US" altLang="zh-CN" dirty="0" err="1"/>
+              <a:t>WinExec</a:t>
+            </a:r>
+            <a:r>
+              <a:rPr lang="zh-CN" altLang="en-US" dirty="0"/>
+              <a:t>（）</a:t>
+            </a:r>
+            <a:r>
+              <a:rPr lang="en-US" altLang="zh-CN" dirty="0"/>
+              <a:t>, </a:t>
+            </a:r>
+            <a:r>
+              <a:rPr lang="en-US" altLang="zh-CN" dirty="0" err="1"/>
+              <a:t>ShellExecute</a:t>
+            </a:r>
+            <a:r>
+              <a:rPr lang="zh-CN" altLang="en-US" dirty="0"/>
+              <a:t>（）</a:t>
+            </a:r>
           </a:p>
         </p:txBody>
       </p:sp>
@@ -4139,6 +4214,101 @@
           <a:p>
             <a:fld id="{FF6B7014-1CA7-42FF-9E69-87C27AE33F47}" type="slidenum">
               <a:rPr lang="zh-CN" altLang="en-US" smtClean="0"/>
+              <a:t>14</a:t>
+            </a:fld>
+            <a:endParaRPr lang="zh-CN" altLang="en-US"/>
+          </a:p>
+        </p:txBody>
+      </p:sp>
+    </p:spTree>
+    <p:extLst>
+      <p:ext uri="{BB962C8B-B14F-4D97-AF65-F5344CB8AC3E}">
+        <p14:creationId xmlns:p14="http://schemas.microsoft.com/office/powerpoint/2010/main" val="2240923161"/>
+      </p:ext>
+    </p:extLst>
+  </p:cSld>
+  <p:clrMapOvr>
+    <a:masterClrMapping/>
+  </p:clrMapOvr>
+</p:notes>
+</file>
+
+<file path=ppt/notesSlides/notesSlide5.xml><?xml version="1.0" encoding="utf-8"?>
+<p:notes xmlns:a="http://schemas.openxmlformats.org/drawingml/2006/main" xmlns:r="http://schemas.openxmlformats.org/officeDocument/2006/relationships" xmlns:p="http://schemas.openxmlformats.org/presentationml/2006/main">
+  <p:cSld>
+    <p:spTree>
+      <p:nvGrpSpPr>
+        <p:cNvPr id="1" name=""/>
+        <p:cNvGrpSpPr/>
+        <p:nvPr/>
+      </p:nvGrpSpPr>
+      <p:grpSpPr>
+        <a:xfrm>
+          <a:off x="0" y="0"/>
+          <a:ext cx="0" cy="0"/>
+          <a:chOff x="0" y="0"/>
+          <a:chExt cx="0" cy="0"/>
+        </a:xfrm>
+      </p:grpSpPr>
+      <p:sp>
+        <p:nvSpPr>
+          <p:cNvPr id="2" name="幻灯片图像占位符 1"/>
+          <p:cNvSpPr>
+            <a:spLocks noGrp="1" noRot="1" noChangeAspect="1"/>
+          </p:cNvSpPr>
+          <p:nvPr>
+            <p:ph type="sldImg"/>
+          </p:nvPr>
+        </p:nvSpPr>
+        <p:spPr/>
+      </p:sp>
+      <p:sp>
+        <p:nvSpPr>
+          <p:cNvPr id="3" name="备注占位符 2"/>
+          <p:cNvSpPr>
+            <a:spLocks noGrp="1"/>
+          </p:cNvSpPr>
+          <p:nvPr>
+            <p:ph type="body" idx="1"/>
+          </p:nvPr>
+        </p:nvSpPr>
+        <p:spPr/>
+        <p:txBody>
+          <a:bodyPr/>
+          <a:lstStyle/>
+          <a:p>
+            <a:r>
+              <a:rPr lang="en-US" altLang="zh-CN" dirty="0"/>
+              <a:t>pip</a:t>
+            </a:r>
+            <a:br>
+              <a:rPr lang="en-US" altLang="zh-CN" dirty="0"/>
+            </a:br>
+            <a:r>
+              <a:rPr lang="en-US" altLang="zh-CN" dirty="0"/>
+              <a:t>apt-get</a:t>
+            </a:r>
+            <a:endParaRPr lang="zh-CN" altLang="en-US" dirty="0"/>
+          </a:p>
+        </p:txBody>
+      </p:sp>
+      <p:sp>
+        <p:nvSpPr>
+          <p:cNvPr id="4" name="灯片编号占位符 3"/>
+          <p:cNvSpPr>
+            <a:spLocks noGrp="1"/>
+          </p:cNvSpPr>
+          <p:nvPr>
+            <p:ph type="sldNum" sz="quarter" idx="5"/>
+          </p:nvPr>
+        </p:nvSpPr>
+        <p:spPr/>
+        <p:txBody>
+          <a:bodyPr/>
+          <a:lstStyle/>
+          <a:p>
+            <a:fld id="{FF6B7014-1CA7-42FF-9E69-87C27AE33F47}" type="slidenum">
+              <a:rPr lang="zh-CN" altLang="en-US" smtClean="0"/>
               <a:t>16</a:t>
             </a:fld>
             <a:endParaRPr lang="zh-CN" altLang="en-US"/>
@@ -4158,7 +4328,7 @@
 </p:notes>
 </file>
 
-<file path=ppt/notesSlides/notesSlide5.xml><?xml version="1.0" encoding="utf-8"?>
+<file path=ppt/notesSlides/notesSlide6.xml><?xml version="1.0" encoding="utf-8"?>
 <p:notes xmlns:a="http://schemas.openxmlformats.org/drawingml/2006/main" xmlns:r="http://schemas.openxmlformats.org/officeDocument/2006/relationships" xmlns:p="http://schemas.openxmlformats.org/presentationml/2006/main">
   <p:cSld>
     <p:spTree>
@@ -4452,7 +4622,7 @@
           <a:p>
             <a:fld id="{F0A08C6D-CA89-457F-88D7-56281A3E4E44}" type="datetimeFigureOut">
               <a:rPr lang="zh-CN" altLang="en-US" smtClean="0"/>
-              <a:t>2020/9/15</a:t>
+              <a:t>2020/9/16</a:t>
             </a:fld>
             <a:endParaRPr lang="zh-CN" altLang="en-US"/>
           </a:p>
@@ -5162,7 +5332,7 @@
           <a:p>
             <a:fld id="{F0A08C6D-CA89-457F-88D7-56281A3E4E44}" type="datetimeFigureOut">
               <a:rPr lang="zh-CN" altLang="en-US" smtClean="0"/>
-              <a:t>2020/9/15</a:t>
+              <a:t>2020/9/16</a:t>
             </a:fld>
             <a:endParaRPr lang="zh-CN" altLang="en-US"/>
           </a:p>

</xml_diff>